<commit_message>
fix: modified the ppt
</commit_message>
<xml_diff>
--- a/Playwright_framework.pptx
+++ b/Playwright_framework.pptx
@@ -3947,7 +3947,7 @@
             </a:r>
             <a:r>
               <a:rPr lang="en-US" altLang="en-GB" sz="2000">
-                <a:hlinkClick r:id="rId1" tooltip="" action="ppaction://hlinkfile"/>
+                <a:hlinkClick r:id="rId1" action="ppaction://hlinkfile"/>
               </a:rPr>
               <a:t>Playwright Trace Viewer</a:t>
             </a:r>
@@ -4339,7 +4339,7 @@
               <a:rPr lang="en-GB" altLang="en-US" sz="1400">
                 <a:sym typeface="+mn-ea"/>
               </a:rPr>
-              <a:t>Custom Execution - Browserstack &amp; LambdaTest</a:t>
+              <a:t>Custom Execution - Browserstack</a:t>
             </a:r>
             <a:endParaRPr lang="en-US" altLang="en-GB" sz="1400"/>
           </a:p>
@@ -5230,7 +5230,7 @@
           <a:p>
             <a:r>
               <a:rPr lang="en-GB" altLang="en-US"/>
-              <a:t>Custom Execution - Browserstack &amp; LambdaTest</a:t>
+              <a:t>Custom Execution - Browserstack</a:t>
             </a:r>
             <a:endParaRPr lang="en-US" altLang="en-GB"/>
           </a:p>
@@ -5282,51 +5282,7 @@
             </a:r>
             <a:r>
               <a:rPr lang="en-US" altLang="en-GB" sz="2000" i="1"/>
-              <a:t>BROWSERSTACK_ACCESS_KEY</a:t>
-            </a:r>
-            <a:endParaRPr lang="en-US" altLang="en-GB" sz="2000"/>
-          </a:p>
-          <a:p>
-            <a:endParaRPr lang="en-US" altLang="en-GB" sz="2000" b="1"/>
-          </a:p>
-          <a:p>
-            <a:pPr marL="0" indent="0">
-              <a:buNone/>
-            </a:pPr>
-            <a:r>
-              <a:rPr lang="en-US" altLang="en-GB" sz="2000" b="1"/>
-              <a:t>Execution in LambdaTest:</a:t>
-            </a:r>
-            <a:endParaRPr lang="en-US" altLang="en-GB" sz="2000" b="1"/>
-          </a:p>
-          <a:p>
-            <a:pPr algn="l">
-              <a:buClrTx/>
-              <a:buSzTx/>
-            </a:pPr>
-            <a:r>
-              <a:rPr lang="en-US" altLang="en-GB" sz="2000"/>
-              <a:t>Set environment variables: </a:t>
-            </a:r>
-            <a:r>
-              <a:rPr lang="en-US" altLang="en-GB" sz="2000" i="1"/>
-              <a:t>LOCALBROWSER</a:t>
-            </a:r>
-            <a:r>
-              <a:rPr lang="en-US" altLang="en-GB" sz="2000"/>
-              <a:t>=false,</a:t>
-            </a:r>
-            <a:r>
-              <a:rPr lang="en-US" altLang="en-GB" sz="2000" i="1"/>
-              <a:t> LT_USERNAME</a:t>
-            </a:r>
-            <a:r>
-              <a:rPr lang="en-US" altLang="en-GB" sz="2000"/>
-              <a:t>, </a:t>
-            </a:r>
-            <a:r>
-              <a:rPr lang="en-US" altLang="en-GB" sz="2000" i="1"/>
-              <a:t>LT_ACCESS_KEY</a:t>
+              <a:t>BROWSERSTACK_ACCESS_KEY in .env file</a:t>
             </a:r>
             <a:endParaRPr lang="en-US" altLang="en-GB" sz="2000" i="1"/>
           </a:p>

</xml_diff>

<commit_message>
feat: Implemented LambdaTEst util file
</commit_message>
<xml_diff>
--- a/Playwright_framework.pptx
+++ b/Playwright_framework.pptx
@@ -3947,7 +3947,7 @@
             </a:r>
             <a:r>
               <a:rPr lang="en-US" altLang="en-GB" sz="2000">
-                <a:hlinkClick r:id="rId1" action="ppaction://hlinkfile"/>
+                <a:hlinkClick r:id="rId1" tooltip="" action="ppaction://hlinkfile"/>
               </a:rPr>
               <a:t>Playwright Trace Viewer</a:t>
             </a:r>
@@ -4339,7 +4339,7 @@
               <a:rPr lang="en-GB" altLang="en-US" sz="1400">
                 <a:sym typeface="+mn-ea"/>
               </a:rPr>
-              <a:t>Custom Execution - Browserstack</a:t>
+              <a:t>Custom Execution - Browserstack &amp; LambdaTest</a:t>
             </a:r>
             <a:endParaRPr lang="en-US" altLang="en-GB" sz="1400"/>
           </a:p>
@@ -5230,7 +5230,7 @@
           <a:p>
             <a:r>
               <a:rPr lang="en-GB" altLang="en-US"/>
-              <a:t>Custom Execution - Browserstack</a:t>
+              <a:t>Custom Execution - Browserstack &amp; LambdaTest</a:t>
             </a:r>
             <a:endParaRPr lang="en-US" altLang="en-GB"/>
           </a:p>
@@ -5282,7 +5282,51 @@
             </a:r>
             <a:r>
               <a:rPr lang="en-US" altLang="en-GB" sz="2000" i="1"/>
-              <a:t>BROWSERSTACK_ACCESS_KEY in .env file</a:t>
+              <a:t>BROWSERSTACK_ACCESS_KEY</a:t>
+            </a:r>
+            <a:endParaRPr lang="en-US" altLang="en-GB" sz="2000"/>
+          </a:p>
+          <a:p>
+            <a:endParaRPr lang="en-US" altLang="en-GB" sz="2000" b="1"/>
+          </a:p>
+          <a:p>
+            <a:pPr marL="0" indent="0">
+              <a:buNone/>
+            </a:pPr>
+            <a:r>
+              <a:rPr lang="en-US" altLang="en-GB" sz="2000" b="1"/>
+              <a:t>Execution in LambdaTest:</a:t>
+            </a:r>
+            <a:endParaRPr lang="en-US" altLang="en-GB" sz="2000" b="1"/>
+          </a:p>
+          <a:p>
+            <a:pPr algn="l">
+              <a:buClrTx/>
+              <a:buSzTx/>
+            </a:pPr>
+            <a:r>
+              <a:rPr lang="en-US" altLang="en-GB" sz="2000"/>
+              <a:t>Set environment variables: </a:t>
+            </a:r>
+            <a:r>
+              <a:rPr lang="en-US" altLang="en-GB" sz="2000" i="1"/>
+              <a:t>LOCALBROWSER</a:t>
+            </a:r>
+            <a:r>
+              <a:rPr lang="en-US" altLang="en-GB" sz="2000"/>
+              <a:t>=false,</a:t>
+            </a:r>
+            <a:r>
+              <a:rPr lang="en-US" altLang="en-GB" sz="2000" i="1"/>
+              <a:t> LT_USERNAME</a:t>
+            </a:r>
+            <a:r>
+              <a:rPr lang="en-US" altLang="en-GB" sz="2000"/>
+              <a:t>, </a:t>
+            </a:r>
+            <a:r>
+              <a:rPr lang="en-US" altLang="en-GB" sz="2000" i="1"/>
+              <a:t>LT_ACCESS_KEY</a:t>
             </a:r>
             <a:endParaRPr lang="en-US" altLang="en-GB" sz="2000" i="1"/>
           </a:p>

</xml_diff>